<commit_message>
case study 3 inst
</commit_message>
<xml_diff>
--- a/week 5/Dylan Scott Week 5 presession questions.pptx
+++ b/week 5/Dylan Scott Week 5 presession questions.pptx
@@ -6,6 +6,8 @@
   </p:sldMasterIdLst>
   <p:sldIdLst>
     <p:sldId id="256" r:id="rId2"/>
+    <p:sldId id="257" r:id="rId3"/>
+    <p:sldId id="258" r:id="rId4"/>
   </p:sldIdLst>
   <p:sldSz cx="12192000" cy="6858000"/>
   <p:notesSz cx="6858000" cy="9144000"/>
@@ -259,7 +261,7 @@
           <a:p>
             <a:fld id="{AC6DD6A3-545F-4068-83A6-A69651DBC5FA}" type="datetimeFigureOut">
               <a:rPr lang="en-US" smtClean="0"/>
-              <a:t>5/16/2022</a:t>
+              <a:t>5/20/2022</a:t>
             </a:fld>
             <a:endParaRPr lang="en-US"/>
           </a:p>
@@ -457,7 +459,7 @@
           <a:p>
             <a:fld id="{AC6DD6A3-545F-4068-83A6-A69651DBC5FA}" type="datetimeFigureOut">
               <a:rPr lang="en-US" smtClean="0"/>
-              <a:t>5/16/2022</a:t>
+              <a:t>5/20/2022</a:t>
             </a:fld>
             <a:endParaRPr lang="en-US"/>
           </a:p>
@@ -665,7 +667,7 @@
           <a:p>
             <a:fld id="{AC6DD6A3-545F-4068-83A6-A69651DBC5FA}" type="datetimeFigureOut">
               <a:rPr lang="en-US" smtClean="0"/>
-              <a:t>5/16/2022</a:t>
+              <a:t>5/20/2022</a:t>
             </a:fld>
             <a:endParaRPr lang="en-US"/>
           </a:p>
@@ -863,7 +865,7 @@
           <a:p>
             <a:fld id="{AC6DD6A3-545F-4068-83A6-A69651DBC5FA}" type="datetimeFigureOut">
               <a:rPr lang="en-US" smtClean="0"/>
-              <a:t>5/16/2022</a:t>
+              <a:t>5/20/2022</a:t>
             </a:fld>
             <a:endParaRPr lang="en-US"/>
           </a:p>
@@ -1138,7 +1140,7 @@
           <a:p>
             <a:fld id="{AC6DD6A3-545F-4068-83A6-A69651DBC5FA}" type="datetimeFigureOut">
               <a:rPr lang="en-US" smtClean="0"/>
-              <a:t>5/16/2022</a:t>
+              <a:t>5/20/2022</a:t>
             </a:fld>
             <a:endParaRPr lang="en-US"/>
           </a:p>
@@ -1403,7 +1405,7 @@
           <a:p>
             <a:fld id="{AC6DD6A3-545F-4068-83A6-A69651DBC5FA}" type="datetimeFigureOut">
               <a:rPr lang="en-US" smtClean="0"/>
-              <a:t>5/16/2022</a:t>
+              <a:t>5/20/2022</a:t>
             </a:fld>
             <a:endParaRPr lang="en-US"/>
           </a:p>
@@ -1815,7 +1817,7 @@
           <a:p>
             <a:fld id="{AC6DD6A3-545F-4068-83A6-A69651DBC5FA}" type="datetimeFigureOut">
               <a:rPr lang="en-US" smtClean="0"/>
-              <a:t>5/16/2022</a:t>
+              <a:t>5/20/2022</a:t>
             </a:fld>
             <a:endParaRPr lang="en-US"/>
           </a:p>
@@ -1956,7 +1958,7 @@
           <a:p>
             <a:fld id="{AC6DD6A3-545F-4068-83A6-A69651DBC5FA}" type="datetimeFigureOut">
               <a:rPr lang="en-US" smtClean="0"/>
-              <a:t>5/16/2022</a:t>
+              <a:t>5/20/2022</a:t>
             </a:fld>
             <a:endParaRPr lang="en-US"/>
           </a:p>
@@ -2069,7 +2071,7 @@
           <a:p>
             <a:fld id="{AC6DD6A3-545F-4068-83A6-A69651DBC5FA}" type="datetimeFigureOut">
               <a:rPr lang="en-US" smtClean="0"/>
-              <a:t>5/16/2022</a:t>
+              <a:t>5/20/2022</a:t>
             </a:fld>
             <a:endParaRPr lang="en-US"/>
           </a:p>
@@ -2380,7 +2382,7 @@
           <a:p>
             <a:fld id="{AC6DD6A3-545F-4068-83A6-A69651DBC5FA}" type="datetimeFigureOut">
               <a:rPr lang="en-US" smtClean="0"/>
-              <a:t>5/16/2022</a:t>
+              <a:t>5/20/2022</a:t>
             </a:fld>
             <a:endParaRPr lang="en-US"/>
           </a:p>
@@ -2668,7 +2670,7 @@
           <a:p>
             <a:fld id="{AC6DD6A3-545F-4068-83A6-A69651DBC5FA}" type="datetimeFigureOut">
               <a:rPr lang="en-US" smtClean="0"/>
-              <a:t>5/16/2022</a:t>
+              <a:t>5/20/2022</a:t>
             </a:fld>
             <a:endParaRPr lang="en-US"/>
           </a:p>
@@ -2909,7 +2911,7 @@
           <a:p>
             <a:fld id="{AC6DD6A3-545F-4068-83A6-A69651DBC5FA}" type="datetimeFigureOut">
               <a:rPr lang="en-US" smtClean="0"/>
-              <a:t>5/16/2022</a:t>
+              <a:t>5/20/2022</a:t>
             </a:fld>
             <a:endParaRPr lang="en-US"/>
           </a:p>
@@ -3395,6 +3397,172 @@
 </p:sld>
 </file>
 
+<file path=ppt/slides/slide2.xml><?xml version="1.0" encoding="utf-8"?>
+<p:sld xmlns:a="http://schemas.openxmlformats.org/drawingml/2006/main" xmlns:r="http://schemas.openxmlformats.org/officeDocument/2006/relationships" xmlns:p="http://schemas.openxmlformats.org/presentationml/2006/main">
+  <p:cSld>
+    <p:spTree>
+      <p:nvGrpSpPr>
+        <p:cNvPr id="1" name=""/>
+        <p:cNvGrpSpPr/>
+        <p:nvPr/>
+      </p:nvGrpSpPr>
+      <p:grpSpPr>
+        <a:xfrm>
+          <a:off x="0" y="0"/>
+          <a:ext cx="0" cy="0"/>
+          <a:chOff x="0" y="0"/>
+          <a:chExt cx="0" cy="0"/>
+        </a:xfrm>
+      </p:grpSpPr>
+      <p:sp>
+        <p:nvSpPr>
+          <p:cNvPr id="2" name="Title 1">
+            <a:extLst>
+              <a:ext uri="{FF2B5EF4-FFF2-40B4-BE49-F238E27FC236}">
+                <a16:creationId xmlns:a16="http://schemas.microsoft.com/office/drawing/2014/main" id="{FBCB856B-31A9-A5B9-13F9-E317766A2A5D}"/>
+              </a:ext>
+            </a:extLst>
+          </p:cNvPr>
+          <p:cNvSpPr>
+            <a:spLocks noGrp="1"/>
+          </p:cNvSpPr>
+          <p:nvPr>
+            <p:ph type="title"/>
+          </p:nvPr>
+        </p:nvSpPr>
+        <p:spPr/>
+        <p:txBody>
+          <a:bodyPr/>
+          <a:lstStyle/>
+          <a:p>
+            <a:r>
+              <a:rPr lang="en-US" dirty="0"/>
+              <a:t>Clustering notes</a:t>
+            </a:r>
+          </a:p>
+        </p:txBody>
+      </p:sp>
+      <p:sp>
+        <p:nvSpPr>
+          <p:cNvPr id="3" name="Content Placeholder 2">
+            <a:extLst>
+              <a:ext uri="{FF2B5EF4-FFF2-40B4-BE49-F238E27FC236}">
+                <a16:creationId xmlns:a16="http://schemas.microsoft.com/office/drawing/2014/main" id="{79BE64A8-E887-8021-A028-DCDDC1A2F4EE}"/>
+              </a:ext>
+            </a:extLst>
+          </p:cNvPr>
+          <p:cNvSpPr>
+            <a:spLocks noGrp="1"/>
+          </p:cNvSpPr>
+          <p:nvPr>
+            <p:ph idx="1"/>
+          </p:nvPr>
+        </p:nvSpPr>
+        <p:spPr/>
+        <p:txBody>
+          <a:bodyPr/>
+          <a:lstStyle/>
+          <a:p>
+            <a:endParaRPr lang="en-US"/>
+          </a:p>
+        </p:txBody>
+      </p:sp>
+    </p:spTree>
+    <p:extLst>
+      <p:ext uri="{BB962C8B-B14F-4D97-AF65-F5344CB8AC3E}">
+        <p14:creationId xmlns:p14="http://schemas.microsoft.com/office/powerpoint/2010/main" val="553840960"/>
+      </p:ext>
+    </p:extLst>
+  </p:cSld>
+  <p:clrMapOvr>
+    <a:masterClrMapping/>
+  </p:clrMapOvr>
+</p:sld>
+</file>
+
+<file path=ppt/slides/slide3.xml><?xml version="1.0" encoding="utf-8"?>
+<p:sld xmlns:a="http://schemas.openxmlformats.org/drawingml/2006/main" xmlns:r="http://schemas.openxmlformats.org/officeDocument/2006/relationships" xmlns:p="http://schemas.openxmlformats.org/presentationml/2006/main">
+  <p:cSld>
+    <p:spTree>
+      <p:nvGrpSpPr>
+        <p:cNvPr id="1" name=""/>
+        <p:cNvGrpSpPr/>
+        <p:nvPr/>
+      </p:nvGrpSpPr>
+      <p:grpSpPr>
+        <a:xfrm>
+          <a:off x="0" y="0"/>
+          <a:ext cx="0" cy="0"/>
+          <a:chOff x="0" y="0"/>
+          <a:chExt cx="0" cy="0"/>
+        </a:xfrm>
+      </p:grpSpPr>
+      <p:sp>
+        <p:nvSpPr>
+          <p:cNvPr id="2" name="Title 1">
+            <a:extLst>
+              <a:ext uri="{FF2B5EF4-FFF2-40B4-BE49-F238E27FC236}">
+                <a16:creationId xmlns:a16="http://schemas.microsoft.com/office/drawing/2014/main" id="{2B818FEE-E628-D5F8-61B2-F3B3A3DFC86A}"/>
+              </a:ext>
+            </a:extLst>
+          </p:cNvPr>
+          <p:cNvSpPr>
+            <a:spLocks noGrp="1"/>
+          </p:cNvSpPr>
+          <p:nvPr>
+            <p:ph type="title"/>
+          </p:nvPr>
+        </p:nvSpPr>
+        <p:spPr/>
+        <p:txBody>
+          <a:bodyPr/>
+          <a:lstStyle/>
+          <a:p>
+            <a:r>
+              <a:rPr lang="en-US"/>
+              <a:t>Clustering questions </a:t>
+            </a:r>
+          </a:p>
+        </p:txBody>
+      </p:sp>
+      <p:sp>
+        <p:nvSpPr>
+          <p:cNvPr id="3" name="Content Placeholder 2">
+            <a:extLst>
+              <a:ext uri="{FF2B5EF4-FFF2-40B4-BE49-F238E27FC236}">
+                <a16:creationId xmlns:a16="http://schemas.microsoft.com/office/drawing/2014/main" id="{08F19543-B8B1-0EC5-090B-B8A5351A9745}"/>
+              </a:ext>
+            </a:extLst>
+          </p:cNvPr>
+          <p:cNvSpPr>
+            <a:spLocks noGrp="1"/>
+          </p:cNvSpPr>
+          <p:nvPr>
+            <p:ph idx="1"/>
+          </p:nvPr>
+        </p:nvSpPr>
+        <p:spPr/>
+        <p:txBody>
+          <a:bodyPr/>
+          <a:lstStyle/>
+          <a:p>
+            <a:endParaRPr lang="en-US"/>
+          </a:p>
+        </p:txBody>
+      </p:sp>
+    </p:spTree>
+    <p:extLst>
+      <p:ext uri="{BB962C8B-B14F-4D97-AF65-F5344CB8AC3E}">
+        <p14:creationId xmlns:p14="http://schemas.microsoft.com/office/powerpoint/2010/main" val="3896009775"/>
+      </p:ext>
+    </p:extLst>
+  </p:cSld>
+  <p:clrMapOvr>
+    <a:masterClrMapping/>
+  </p:clrMapOvr>
+</p:sld>
+</file>
+
 <file path=ppt/theme/theme1.xml><?xml version="1.0" encoding="utf-8"?>
 <a:theme xmlns:a="http://schemas.openxmlformats.org/drawingml/2006/main" name="Office Theme">
   <a:themeElements>

</xml_diff>

<commit_message>
Update Dylan Scott Week 5 presession questions.pptx
</commit_message>
<xml_diff>
--- a/week 5/Dylan Scott Week 5 presession questions.pptx
+++ b/week 5/Dylan Scott Week 5 presession questions.pptx
@@ -3463,7 +3463,83 @@
           <a:bodyPr/>
           <a:lstStyle/>
           <a:p>
-            <a:endParaRPr lang="en-US"/>
+            <a:r>
+              <a:rPr lang="en-US" dirty="0"/>
+              <a:t>Term frequency – inverse document frequency</a:t>
+            </a:r>
+          </a:p>
+          <a:p>
+            <a:pPr lvl="1"/>
+            <a:r>
+              <a:rPr lang="en-US" dirty="0"/>
+              <a:t>This helps us determine how often a work is used</a:t>
+            </a:r>
+          </a:p>
+          <a:p>
+            <a:pPr lvl="1"/>
+            <a:r>
+              <a:rPr lang="en-US" dirty="0"/>
+              <a:t>Then shows us if these popular words are exclusive to 1 or more documents</a:t>
+            </a:r>
+          </a:p>
+          <a:p>
+            <a:r>
+              <a:rPr lang="en-US" dirty="0"/>
+              <a:t>How far apart are these vectors in space</a:t>
+            </a:r>
+          </a:p>
+          <a:p>
+            <a:pPr lvl="1"/>
+            <a:r>
+              <a:rPr lang="en-US" dirty="0"/>
+              <a:t>I have not used </a:t>
+            </a:r>
+            <a:r>
+              <a:rPr lang="en-US" dirty="0" err="1"/>
+              <a:t>db</a:t>
+            </a:r>
+            <a:r>
+              <a:rPr lang="en-US" dirty="0"/>
+              <a:t> scan – looks for distance of the points</a:t>
+            </a:r>
+          </a:p>
+          <a:p>
+            <a:pPr lvl="1"/>
+            <a:r>
+              <a:rPr lang="en-US" dirty="0"/>
+              <a:t>K means can have predefined clusters</a:t>
+            </a:r>
+          </a:p>
+          <a:p>
+            <a:r>
+              <a:rPr lang="en-US" dirty="0"/>
+              <a:t>Distance</a:t>
+            </a:r>
+          </a:p>
+          <a:p>
+            <a:pPr lvl="1"/>
+            <a:r>
+              <a:rPr lang="en-US" dirty="0" err="1"/>
+              <a:t>Manhatten</a:t>
+            </a:r>
+            <a:r>
+              <a:rPr lang="en-US" dirty="0"/>
+              <a:t> distance </a:t>
+            </a:r>
+          </a:p>
+          <a:p>
+            <a:pPr lvl="1"/>
+            <a:r>
+              <a:rPr lang="en-US" dirty="0"/>
+              <a:t>Cosine distance </a:t>
+            </a:r>
+          </a:p>
+          <a:p>
+            <a:pPr lvl="1"/>
+            <a:r>
+              <a:rPr lang="en-US" dirty="0"/>
+              <a:t>Euclidian distance</a:t>
+            </a:r>
           </a:p>
         </p:txBody>
       </p:sp>
@@ -3519,7 +3595,7 @@
           <a:lstStyle/>
           <a:p>
             <a:r>
-              <a:rPr lang="en-US"/>
+              <a:rPr lang="en-US" dirty="0"/>
               <a:t>Clustering questions </a:t>
             </a:r>
           </a:p>
@@ -3545,6 +3621,23 @@
         <p:txBody>
           <a:bodyPr/>
           <a:lstStyle/>
+          <a:p>
+            <a:r>
+              <a:rPr lang="en-US" dirty="0"/>
+              <a:t>How can you judge how many clusters there are in your data when using k means?</a:t>
+            </a:r>
+          </a:p>
+          <a:p>
+            <a:pPr lvl="1"/>
+            <a:r>
+              <a:rPr lang="en-US" dirty="0"/>
+              <a:t>We are using this for our capstone to see how many types of buyers we have in our data and we think there is 4 but that is just </a:t>
+            </a:r>
+            <a:r>
+              <a:rPr lang="en-US"/>
+              <a:t>a guest</a:t>
+            </a:r>
+          </a:p>
           <a:p>
             <a:endParaRPr lang="en-US"/>
           </a:p>

</xml_diff>